<commit_message>
One page deleted,Two page added
</commit_message>
<xml_diff>
--- a/GitSunum.pptx
+++ b/GitSunum.pptx
@@ -17,7 +17,7 @@
     <p:sldId id="258" r:id="rId8"/>
     <p:sldId id="259" r:id="rId9"/>
     <p:sldId id="260" r:id="rId10"/>
-    <p:sldId id="264" r:id="rId11"/>
+    <p:sldId id="270" r:id="rId11"/>
     <p:sldId id="265" r:id="rId12"/>
     <p:sldId id="269" r:id="rId13"/>
     <p:sldId id="266" r:id="rId14"/>
@@ -120,6 +120,11 @@
       </a:defRPr>
     </a:lvl9pPr>
   </p:defaultTextStyle>
+  <p:extLst>
+    <p:ext uri="{EFAFB233-063F-42B5-8137-9DF3F51BA10A}">
+      <p15:sldGuideLst xmlns:p15="http://schemas.microsoft.com/office/powerpoint/2012/main"/>
+    </p:ext>
+  </p:extLst>
 </p:presentation>
 </file>
 
@@ -1814,6 +1819,13 @@
         </dgm:presLayoutVars>
       </dgm:prSet>
       <dgm:spPr/>
+      <dgm:t>
+        <a:bodyPr/>
+        <a:lstStyle/>
+        <a:p>
+          <a:endParaRPr lang="tr-TR"/>
+        </a:p>
+      </dgm:t>
     </dgm:pt>
     <dgm:pt modelId="{4F44D3C5-DE39-4298-BDFD-F17DEECDE9FA}" type="pres">
       <dgm:prSet presAssocID="{AA21FBDB-590B-4DE9-BED2-DC1F80CBF496}" presName="vertOne" presStyleCnt="0"/>
@@ -1826,6 +1838,13 @@
         </dgm:presLayoutVars>
       </dgm:prSet>
       <dgm:spPr/>
+      <dgm:t>
+        <a:bodyPr/>
+        <a:lstStyle/>
+        <a:p>
+          <a:endParaRPr lang="tr-TR"/>
+        </a:p>
+      </dgm:t>
     </dgm:pt>
     <dgm:pt modelId="{0FBF8A6A-A8D9-41C1-AED2-27DDFACCF0AA}" type="pres">
       <dgm:prSet presAssocID="{AA21FBDB-590B-4DE9-BED2-DC1F80CBF496}" presName="parTransOne" presStyleCnt="0"/>
@@ -1846,6 +1865,13 @@
         </dgm:presLayoutVars>
       </dgm:prSet>
       <dgm:spPr/>
+      <dgm:t>
+        <a:bodyPr/>
+        <a:lstStyle/>
+        <a:p>
+          <a:endParaRPr lang="tr-TR"/>
+        </a:p>
+      </dgm:t>
     </dgm:pt>
     <dgm:pt modelId="{526F37C8-A9B8-4698-BFEA-BB1D850FC8D8}" type="pres">
       <dgm:prSet presAssocID="{5A6255F3-1AC8-43D4-9507-984F6CAD9600}" presName="horzTwo" presStyleCnt="0"/>
@@ -1866,6 +1892,13 @@
         </dgm:presLayoutVars>
       </dgm:prSet>
       <dgm:spPr/>
+      <dgm:t>
+        <a:bodyPr/>
+        <a:lstStyle/>
+        <a:p>
+          <a:endParaRPr lang="tr-TR"/>
+        </a:p>
+      </dgm:t>
     </dgm:pt>
     <dgm:pt modelId="{8F25108C-DEFF-47BB-8FE3-FBFA747223E5}" type="pres">
       <dgm:prSet presAssocID="{B31C6CCA-21C4-40C0-9CDB-53EBC25C0E2C}" presName="horzTwo" presStyleCnt="0"/>
@@ -1886,6 +1919,13 @@
         </dgm:presLayoutVars>
       </dgm:prSet>
       <dgm:spPr/>
+      <dgm:t>
+        <a:bodyPr/>
+        <a:lstStyle/>
+        <a:p>
+          <a:endParaRPr lang="tr-TR"/>
+        </a:p>
+      </dgm:t>
     </dgm:pt>
     <dgm:pt modelId="{1597A231-8C6D-4227-BB21-08B5A3D468FA}" type="pres">
       <dgm:prSet presAssocID="{946EBD32-93EB-4A7E-8D20-538A966AA7E9}" presName="horzTwo" presStyleCnt="0"/>
@@ -2093,8 +2133,8 @@
   </dgm:ptLst>
   <dgm:cxnLst>
     <dgm:cxn modelId="{3B96B277-99DD-44AB-B935-E409F6D3D6B4}" type="presOf" srcId="{19E53207-E385-461E-9253-7DE800579983}" destId="{868B8BE3-CD9E-41A2-9044-3D67D28C0A52}" srcOrd="0" destOrd="0" presId="urn:microsoft.com/office/officeart/2005/8/layout/hProcess3"/>
+    <dgm:cxn modelId="{53075147-BD53-49DD-BEC3-E359135E29FD}" type="presOf" srcId="{1950C646-E363-4411-A650-106DC90DB64A}" destId="{6C209911-053C-47D6-928B-FD25082DDC08}" srcOrd="0" destOrd="0" presId="urn:microsoft.com/office/officeart/2005/8/layout/hProcess3"/>
     <dgm:cxn modelId="{C2F82F9C-1CD1-4F86-B807-2774B2774EB8}" srcId="{1950C646-E363-4411-A650-106DC90DB64A}" destId="{19E53207-E385-461E-9253-7DE800579983}" srcOrd="0" destOrd="0" parTransId="{49BA5E3D-58C6-4D8D-A236-5A249F535944}" sibTransId="{FD1025A7-7A48-4946-BE65-51CC94E5FD75}"/>
-    <dgm:cxn modelId="{53075147-BD53-49DD-BEC3-E359135E29FD}" type="presOf" srcId="{1950C646-E363-4411-A650-106DC90DB64A}" destId="{6C209911-053C-47D6-928B-FD25082DDC08}" srcOrd="0" destOrd="0" presId="urn:microsoft.com/office/officeart/2005/8/layout/hProcess3"/>
     <dgm:cxn modelId="{D5BF35AA-9DD0-4402-AB26-9DF7C499641E}" type="presParOf" srcId="{6C209911-053C-47D6-928B-FD25082DDC08}" destId="{163DC1CA-38F5-4943-A6DC-1A02744EBD8B}" srcOrd="0" destOrd="0" presId="urn:microsoft.com/office/officeart/2005/8/layout/hProcess3"/>
     <dgm:cxn modelId="{8E3B93BC-27D8-44F0-A653-93DEF39F92F7}" type="presParOf" srcId="{6C209911-053C-47D6-928B-FD25082DDC08}" destId="{FD0B0400-C696-40A9-ACBD-4743EEFD09A5}" srcOrd="1" destOrd="0" presId="urn:microsoft.com/office/officeart/2005/8/layout/hProcess3"/>
     <dgm:cxn modelId="{D40A3CDE-53D5-45FD-95C1-1327A0483618}" type="presParOf" srcId="{FD0B0400-C696-40A9-ACBD-4743EEFD09A5}" destId="{C38962E1-A7ED-4DAB-B5A4-CBE7629AC17A}" srcOrd="0" destOrd="0" presId="urn:microsoft.com/office/officeart/2005/8/layout/hProcess3"/>
@@ -5581,7 +5621,7 @@
           <a:p>
             <a:fld id="{4B394569-EED0-41B9-9496-BED1C7C8BD58}" type="datetimeFigureOut">
               <a:rPr lang="tr-TR" smtClean="0"/>
-              <a:t>20.04.2016</a:t>
+              <a:t>28.04.2016</a:t>
             </a:fld>
             <a:endParaRPr lang="tr-TR"/>
           </a:p>
@@ -6064,7 +6104,7 @@
           <a:p>
             <a:fld id="{CA683572-C06B-49D0-A896-AC215C4D27C9}" type="datetimeFigureOut">
               <a:rPr lang="tr-TR" smtClean="0"/>
-              <a:t>20.04.2016</a:t>
+              <a:t>28.04.2016</a:t>
             </a:fld>
             <a:endParaRPr lang="tr-TR"/>
           </a:p>
@@ -6234,7 +6274,7 @@
           <a:p>
             <a:fld id="{CA683572-C06B-49D0-A896-AC215C4D27C9}" type="datetimeFigureOut">
               <a:rPr lang="tr-TR" smtClean="0"/>
-              <a:t>20.04.2016</a:t>
+              <a:t>28.04.2016</a:t>
             </a:fld>
             <a:endParaRPr lang="tr-TR"/>
           </a:p>
@@ -6414,7 +6454,7 @@
           <a:p>
             <a:fld id="{CA683572-C06B-49D0-A896-AC215C4D27C9}" type="datetimeFigureOut">
               <a:rPr lang="tr-TR" smtClean="0"/>
-              <a:t>20.04.2016</a:t>
+              <a:t>28.04.2016</a:t>
             </a:fld>
             <a:endParaRPr lang="tr-TR"/>
           </a:p>
@@ -6584,7 +6624,7 @@
           <a:p>
             <a:fld id="{CA683572-C06B-49D0-A896-AC215C4D27C9}" type="datetimeFigureOut">
               <a:rPr lang="tr-TR" smtClean="0"/>
-              <a:t>20.04.2016</a:t>
+              <a:t>28.04.2016</a:t>
             </a:fld>
             <a:endParaRPr lang="tr-TR"/>
           </a:p>
@@ -6830,7 +6870,7 @@
           <a:p>
             <a:fld id="{CA683572-C06B-49D0-A896-AC215C4D27C9}" type="datetimeFigureOut">
               <a:rPr lang="tr-TR" smtClean="0"/>
-              <a:t>20.04.2016</a:t>
+              <a:t>28.04.2016</a:t>
             </a:fld>
             <a:endParaRPr lang="tr-TR"/>
           </a:p>
@@ -7062,7 +7102,7 @@
           <a:p>
             <a:fld id="{CA683572-C06B-49D0-A896-AC215C4D27C9}" type="datetimeFigureOut">
               <a:rPr lang="tr-TR" smtClean="0"/>
-              <a:t>20.04.2016</a:t>
+              <a:t>28.04.2016</a:t>
             </a:fld>
             <a:endParaRPr lang="tr-TR"/>
           </a:p>
@@ -7429,7 +7469,7 @@
           <a:p>
             <a:fld id="{CA683572-C06B-49D0-A896-AC215C4D27C9}" type="datetimeFigureOut">
               <a:rPr lang="tr-TR" smtClean="0"/>
-              <a:t>20.04.2016</a:t>
+              <a:t>28.04.2016</a:t>
             </a:fld>
             <a:endParaRPr lang="tr-TR"/>
           </a:p>
@@ -7547,7 +7587,7 @@
           <a:p>
             <a:fld id="{CA683572-C06B-49D0-A896-AC215C4D27C9}" type="datetimeFigureOut">
               <a:rPr lang="tr-TR" smtClean="0"/>
-              <a:t>20.04.2016</a:t>
+              <a:t>28.04.2016</a:t>
             </a:fld>
             <a:endParaRPr lang="tr-TR"/>
           </a:p>
@@ -7642,7 +7682,7 @@
           <a:p>
             <a:fld id="{CA683572-C06B-49D0-A896-AC215C4D27C9}" type="datetimeFigureOut">
               <a:rPr lang="tr-TR" smtClean="0"/>
-              <a:t>20.04.2016</a:t>
+              <a:t>28.04.2016</a:t>
             </a:fld>
             <a:endParaRPr lang="tr-TR"/>
           </a:p>
@@ -7919,7 +7959,7 @@
           <a:p>
             <a:fld id="{CA683572-C06B-49D0-A896-AC215C4D27C9}" type="datetimeFigureOut">
               <a:rPr lang="tr-TR" smtClean="0"/>
-              <a:t>20.04.2016</a:t>
+              <a:t>28.04.2016</a:t>
             </a:fld>
             <a:endParaRPr lang="tr-TR"/>
           </a:p>
@@ -8172,7 +8212,7 @@
           <a:p>
             <a:fld id="{CA683572-C06B-49D0-A896-AC215C4D27C9}" type="datetimeFigureOut">
               <a:rPr lang="tr-TR" smtClean="0"/>
-              <a:t>20.04.2016</a:t>
+              <a:t>28.04.2016</a:t>
             </a:fld>
             <a:endParaRPr lang="tr-TR"/>
           </a:p>
@@ -8388,7 +8428,7 @@
           <a:p>
             <a:fld id="{CA683572-C06B-49D0-A896-AC215C4D27C9}" type="datetimeFigureOut">
               <a:rPr lang="tr-TR" smtClean="0"/>
-              <a:t>20.04.2016</a:t>
+              <a:t>28.04.2016</a:t>
             </a:fld>
             <a:endParaRPr lang="tr-TR"/>
           </a:p>
@@ -8915,77 +8955,296 @@
             <p:ph type="title"/>
           </p:nvPr>
         </p:nvSpPr>
-        <p:spPr>
-          <a:xfrm>
-            <a:off x="838200" y="365125"/>
-            <a:ext cx="10515600" cy="488315"/>
-          </a:xfrm>
-        </p:spPr>
+        <p:spPr/>
         <p:txBody>
-          <a:bodyPr>
-            <a:normAutofit fontScale="90000"/>
-          </a:bodyPr>
+          <a:bodyPr/>
           <a:lstStyle/>
           <a:p>
+            <a:r>
+              <a:rPr lang="tr-TR" dirty="0" err="1" smtClean="0"/>
+              <a:t>What</a:t>
+            </a:r>
+            <a:r>
+              <a:rPr lang="tr-TR" dirty="0" smtClean="0"/>
+              <a:t> is Git?</a:t>
+            </a:r>
+            <a:r>
+              <a:rPr lang="tr-TR" b="1" dirty="0"/>
+              <a:t/>
+            </a:r>
+            <a:br>
+              <a:rPr lang="tr-TR" b="1" dirty="0"/>
+            </a:br>
             <a:endParaRPr lang="tr-TR" dirty="0"/>
           </a:p>
         </p:txBody>
       </p:sp>
-      <p:pic>
-        <p:nvPicPr>
-          <p:cNvPr id="4" name="İçerik Yer Tutucusu 3"/>
-          <p:cNvPicPr>
-            <a:picLocks noGrp="1" noChangeAspect="1"/>
-          </p:cNvPicPr>
+      <p:sp>
+        <p:nvSpPr>
+          <p:cNvPr id="3" name="İçerik Yer Tutucusu 2"/>
+          <p:cNvSpPr>
+            <a:spLocks noGrp="1"/>
+          </p:cNvSpPr>
           <p:nvPr>
             <p:ph idx="1"/>
           </p:nvPr>
-        </p:nvPicPr>
-        <p:blipFill>
-          <a:blip r:embed="rId2">
-            <a:extLst>
-              <a:ext uri="{28A0092B-C50C-407E-A947-70E740481C1C}">
-                <a14:useLocalDpi xmlns:a14="http://schemas.microsoft.com/office/drawing/2010/main" val="0"/>
-              </a:ext>
-            </a:extLst>
-          </a:blip>
-          <a:stretch>
-            <a:fillRect/>
-          </a:stretch>
-        </p:blipFill>
-        <p:spPr>
-          <a:xfrm>
-            <a:off x="838200" y="1100204"/>
-            <a:ext cx="10515600" cy="4014019"/>
-          </a:xfrm>
-        </p:spPr>
-      </p:pic>
-      <p:sp>
-        <p:nvSpPr>
-          <p:cNvPr id="5" name="Metin kutusu 4"/>
-          <p:cNvSpPr txBox="1"/>
-          <p:nvPr/>
         </p:nvSpPr>
-        <p:spPr>
-          <a:xfrm>
-            <a:off x="3606800" y="5506720"/>
-            <a:ext cx="4958080" cy="369332"/>
-          </a:xfrm>
-          <a:prstGeom prst="rect">
-            <a:avLst/>
-          </a:prstGeom>
-          <a:noFill/>
-        </p:spPr>
+        <p:spPr/>
         <p:txBody>
-          <a:bodyPr wrap="square" rtlCol="0">
-            <a:spAutoFit/>
+          <a:bodyPr>
+            <a:normAutofit lnSpcReduction="10000"/>
           </a:bodyPr>
           <a:lstStyle/>
           <a:p>
             <a:r>
-              <a:rPr lang="en-US" smtClean="0"/>
-              <a:t>Storing data as snapshots of the project over time.</a:t>
-            </a:r>
+              <a:rPr lang="en-US" b="1" dirty="0" err="1"/>
+              <a:t>Git</a:t>
+            </a:r>
+            <a:r>
+              <a:rPr lang="en-US" dirty="0"/>
+              <a:t> </a:t>
+            </a:r>
+            <a:r>
+              <a:rPr lang="en-US" dirty="0" smtClean="0"/>
+              <a:t>is </a:t>
+            </a:r>
+            <a:r>
+              <a:rPr lang="en-US" dirty="0"/>
+              <a:t>a </a:t>
+            </a:r>
+            <a:r>
+              <a:rPr lang="tr-TR" dirty="0" err="1" smtClean="0"/>
+              <a:t>version</a:t>
+            </a:r>
+            <a:r>
+              <a:rPr lang="tr-TR" dirty="0" smtClean="0"/>
+              <a:t> </a:t>
+            </a:r>
+            <a:r>
+              <a:rPr lang="tr-TR" dirty="0" err="1" smtClean="0"/>
+              <a:t>system</a:t>
+            </a:r>
+            <a:r>
+              <a:rPr lang="tr-TR" dirty="0" smtClean="0"/>
+              <a:t> </a:t>
+            </a:r>
+            <a:r>
+              <a:rPr lang="tr-TR" dirty="0" err="1" smtClean="0"/>
+              <a:t>control</a:t>
+            </a:r>
+            <a:r>
+              <a:rPr lang="tr-TR" dirty="0" smtClean="0"/>
+              <a:t> </a:t>
+            </a:r>
+            <a:r>
+              <a:rPr lang="en-US" dirty="0" smtClean="0"/>
+              <a:t>that </a:t>
+            </a:r>
+            <a:r>
+              <a:rPr lang="en-US" dirty="0"/>
+              <a:t>is widely used for </a:t>
+            </a:r>
+            <a:r>
+              <a:rPr lang="tr-TR" dirty="0" smtClean="0"/>
+              <a:t>software </a:t>
+            </a:r>
+            <a:r>
+              <a:rPr lang="tr-TR" dirty="0" err="1" smtClean="0"/>
+              <a:t>development</a:t>
+            </a:r>
+            <a:r>
+              <a:rPr lang="tr-TR" dirty="0" smtClean="0"/>
+              <a:t> </a:t>
+            </a:r>
+            <a:r>
+              <a:rPr lang="en-US" dirty="0" smtClean="0"/>
+              <a:t>and </a:t>
+            </a:r>
+            <a:r>
+              <a:rPr lang="en-US" dirty="0"/>
+              <a:t>other version control tasks. It is a </a:t>
+            </a:r>
+            <a:r>
+              <a:rPr lang="tr-TR" dirty="0" err="1" smtClean="0"/>
+              <a:t>distributed</a:t>
+            </a:r>
+            <a:r>
+              <a:rPr lang="tr-TR" dirty="0" smtClean="0"/>
+              <a:t> </a:t>
+            </a:r>
+            <a:r>
+              <a:rPr lang="tr-TR" dirty="0" err="1" smtClean="0"/>
+              <a:t>revision</a:t>
+            </a:r>
+            <a:r>
+              <a:rPr lang="tr-TR" dirty="0" smtClean="0"/>
+              <a:t> </a:t>
+            </a:r>
+            <a:r>
+              <a:rPr lang="tr-TR" dirty="0" err="1" smtClean="0"/>
+              <a:t>control</a:t>
+            </a:r>
+            <a:r>
+              <a:rPr lang="en-US" dirty="0" smtClean="0"/>
+              <a:t> </a:t>
+            </a:r>
+            <a:r>
+              <a:rPr lang="en-US" dirty="0"/>
+              <a:t>system with an emphasis on speed</a:t>
+            </a:r>
+            <a:r>
+              <a:rPr lang="en-US" dirty="0" smtClean="0"/>
+              <a:t>, </a:t>
+            </a:r>
+            <a:r>
+              <a:rPr lang="en-US" dirty="0"/>
+              <a:t>data integrity</a:t>
+            </a:r>
+            <a:r>
+              <a:rPr lang="en-US" dirty="0" smtClean="0"/>
+              <a:t>, </a:t>
+            </a:r>
+            <a:r>
+              <a:rPr lang="en-US" dirty="0"/>
+              <a:t>and support for distributed, non-linear workflows</a:t>
+            </a:r>
+            <a:r>
+              <a:rPr lang="en-US" dirty="0" smtClean="0"/>
+              <a:t>. </a:t>
+            </a:r>
+            <a:r>
+              <a:rPr lang="en-US" dirty="0" err="1"/>
+              <a:t>Git</a:t>
+            </a:r>
+            <a:r>
+              <a:rPr lang="en-US" dirty="0"/>
+              <a:t> was initially designed and developed in 2005 by </a:t>
+            </a:r>
+            <a:r>
+              <a:rPr lang="tr-TR" dirty="0" smtClean="0"/>
+              <a:t>Linux </a:t>
+            </a:r>
+            <a:r>
+              <a:rPr lang="tr-TR" dirty="0" err="1" smtClean="0"/>
+              <a:t>kernel</a:t>
+            </a:r>
+            <a:r>
+              <a:rPr lang="tr-TR" dirty="0" smtClean="0"/>
+              <a:t> </a:t>
+            </a:r>
+            <a:r>
+              <a:rPr lang="en-US" dirty="0" smtClean="0"/>
+              <a:t>developers </a:t>
+            </a:r>
+            <a:r>
+              <a:rPr lang="en-US" dirty="0"/>
+              <a:t>(including </a:t>
+            </a:r>
+            <a:r>
+              <a:rPr lang="tr-TR" dirty="0" err="1" smtClean="0"/>
+              <a:t>Linus</a:t>
+            </a:r>
+            <a:r>
+              <a:rPr lang="tr-TR" dirty="0" smtClean="0"/>
+              <a:t> </a:t>
+            </a:r>
+            <a:r>
+              <a:rPr lang="tr-TR" dirty="0" err="1" smtClean="0"/>
+              <a:t>Torvalds</a:t>
+            </a:r>
+            <a:r>
+              <a:rPr lang="en-US" dirty="0" smtClean="0"/>
+              <a:t>) </a:t>
+            </a:r>
+            <a:r>
+              <a:rPr lang="en-US" dirty="0"/>
+              <a:t>for Linux kernel development</a:t>
+            </a:r>
+            <a:r>
+              <a:rPr lang="en-US" dirty="0" smtClean="0"/>
+              <a:t>.</a:t>
+            </a:r>
+            <a:endParaRPr lang="tr-TR" dirty="0" smtClean="0"/>
+          </a:p>
+          <a:p>
+            <a:endParaRPr lang="en-US" dirty="0"/>
+          </a:p>
+          <a:p>
+            <a:r>
+              <a:rPr lang="en-US" dirty="0"/>
+              <a:t>As with most other distributed version control systems, and unlike most </a:t>
+            </a:r>
+            <a:r>
+              <a:rPr lang="tr-TR" dirty="0" err="1" smtClean="0"/>
+              <a:t>client</a:t>
+            </a:r>
+            <a:r>
+              <a:rPr lang="tr-TR" dirty="0" smtClean="0"/>
+              <a:t>-server</a:t>
+            </a:r>
+            <a:r>
+              <a:rPr lang="en-US" dirty="0" smtClean="0"/>
+              <a:t> </a:t>
+            </a:r>
+            <a:r>
+              <a:rPr lang="en-US" dirty="0"/>
+              <a:t>systems, every </a:t>
+            </a:r>
+            <a:r>
+              <a:rPr lang="en-US" dirty="0" err="1"/>
+              <a:t>Git</a:t>
+            </a:r>
+            <a:r>
+              <a:rPr lang="en-US" dirty="0"/>
+              <a:t> </a:t>
+            </a:r>
+            <a:r>
+              <a:rPr lang="tr-TR" dirty="0" err="1" smtClean="0"/>
+              <a:t>working</a:t>
+            </a:r>
+            <a:r>
+              <a:rPr lang="tr-TR" dirty="0" smtClean="0"/>
+              <a:t> </a:t>
+            </a:r>
+            <a:r>
+              <a:rPr lang="tr-TR" dirty="0" err="1" smtClean="0"/>
+              <a:t>directory</a:t>
+            </a:r>
+            <a:r>
+              <a:rPr lang="tr-TR" dirty="0" smtClean="0"/>
+              <a:t> </a:t>
+            </a:r>
+            <a:r>
+              <a:rPr lang="en-US" dirty="0" smtClean="0"/>
+              <a:t>is </a:t>
+            </a:r>
+            <a:r>
+              <a:rPr lang="en-US" dirty="0"/>
+              <a:t>a </a:t>
+            </a:r>
+            <a:r>
+              <a:rPr lang="en-US" dirty="0" smtClean="0"/>
+              <a:t>full </a:t>
+            </a:r>
+            <a:r>
+              <a:rPr lang="tr-TR" dirty="0" err="1" smtClean="0"/>
+              <a:t>repository</a:t>
+            </a:r>
+            <a:r>
+              <a:rPr lang="en-US" dirty="0" smtClean="0"/>
+              <a:t> </a:t>
+            </a:r>
+            <a:r>
+              <a:rPr lang="en-US" dirty="0"/>
+              <a:t>with complete history and full version-tracking capabilities, independent of network access or a central server</a:t>
+            </a:r>
+            <a:r>
+              <a:rPr lang="en-US" dirty="0" smtClean="0"/>
+              <a:t>.</a:t>
+            </a:r>
+            <a:endParaRPr lang="en-US" dirty="0"/>
+          </a:p>
+          <a:p>
             <a:endParaRPr lang="tr-TR" dirty="0"/>
           </a:p>
         </p:txBody>
@@ -8993,7 +9252,7 @@
     </p:spTree>
     <p:extLst>
       <p:ext uri="{BB962C8B-B14F-4D97-AF65-F5344CB8AC3E}">
-        <p14:creationId xmlns:p14="http://schemas.microsoft.com/office/powerpoint/2010/main" val="2238891286"/>
+        <p14:creationId xmlns:p14="http://schemas.microsoft.com/office/powerpoint/2010/main" val="169814598"/>
       </p:ext>
     </p:extLst>
   </p:cSld>
@@ -9043,8 +9302,20 @@
           <a:lstStyle/>
           <a:p>
             <a:r>
-              <a:rPr lang="en-US" b="1" dirty="0" smtClean="0"/>
-              <a:t>Nearly Every Operation Is Local</a:t>
+              <a:rPr lang="tr-TR" b="1" dirty="0" err="1" smtClean="0"/>
+              <a:t>Some</a:t>
+            </a:r>
+            <a:r>
+              <a:rPr lang="tr-TR" b="1" dirty="0" smtClean="0"/>
+              <a:t> </a:t>
+            </a:r>
+            <a:r>
+              <a:rPr lang="tr-TR" b="1" dirty="0" err="1" smtClean="0"/>
+              <a:t>Advantages</a:t>
+            </a:r>
+            <a:r>
+              <a:rPr lang="tr-TR" b="1" dirty="0" smtClean="0"/>
+              <a:t> of Git</a:t>
             </a:r>
             <a:endParaRPr lang="tr-TR" b="1" dirty="0"/>
           </a:p>
@@ -9067,20 +9338,40 @@
           </a:bodyPr>
           <a:lstStyle/>
           <a:p>
+            <a:r>
+              <a:rPr lang="en-US" sz="4000" dirty="0"/>
+              <a:t>Strong support for non-linear development</a:t>
+            </a:r>
             <a:endParaRPr lang="tr-TR" sz="4000" dirty="0" smtClean="0"/>
           </a:p>
           <a:p>
             <a:r>
-              <a:rPr lang="en-US" sz="4000" dirty="0" smtClean="0"/>
-              <a:t>Most operations in </a:t>
-            </a:r>
-            <a:r>
-              <a:rPr lang="en-US" sz="4000" dirty="0" err="1" smtClean="0"/>
-              <a:t>Git</a:t>
-            </a:r>
-            <a:r>
-              <a:rPr lang="en-US" sz="4000" dirty="0" smtClean="0"/>
-              <a:t> only need local files and resources to operate</a:t>
+              <a:rPr lang="tr-TR" sz="4000" dirty="0" err="1" smtClean="0"/>
+              <a:t>Nearly</a:t>
+            </a:r>
+            <a:r>
+              <a:rPr lang="tr-TR" sz="4000" dirty="0" smtClean="0"/>
+              <a:t> </a:t>
+            </a:r>
+            <a:r>
+              <a:rPr lang="tr-TR" sz="4000" dirty="0" err="1" smtClean="0"/>
+              <a:t>every</a:t>
+            </a:r>
+            <a:r>
+              <a:rPr lang="tr-TR" sz="4000" dirty="0" smtClean="0"/>
+              <a:t> </a:t>
+            </a:r>
+            <a:r>
+              <a:rPr lang="tr-TR" sz="4000" dirty="0" err="1" smtClean="0"/>
+              <a:t>operation</a:t>
+            </a:r>
+            <a:r>
+              <a:rPr lang="tr-TR" sz="4000" dirty="0" smtClean="0"/>
+              <a:t> in </a:t>
+            </a:r>
+            <a:r>
+              <a:rPr lang="tr-TR" sz="4000" dirty="0" err="1" smtClean="0"/>
+              <a:t>local</a:t>
             </a:r>
             <a:endParaRPr lang="tr-TR" sz="4000" dirty="0" smtClean="0"/>
           </a:p>
@@ -9187,7 +9478,28 @@
             </a:r>
             <a:r>
               <a:rPr lang="tr-TR" sz="4000" dirty="0" smtClean="0"/>
-              <a:t> server.</a:t>
+              <a:t> server</a:t>
+            </a:r>
+            <a:r>
+              <a:rPr lang="tr-TR" sz="4000" dirty="0" smtClean="0"/>
+              <a:t>.</a:t>
+            </a:r>
+          </a:p>
+          <a:p>
+            <a:r>
+              <a:rPr lang="tr-TR" sz="4000" dirty="0"/>
+              <a:t>Distributed </a:t>
+            </a:r>
+            <a:r>
+              <a:rPr lang="tr-TR" sz="4000" dirty="0" err="1"/>
+              <a:t>development</a:t>
+            </a:r>
+            <a:endParaRPr lang="tr-TR" sz="4000" dirty="0" smtClean="0"/>
+          </a:p>
+          <a:p>
+            <a:r>
+              <a:rPr lang="en-US" sz="4000" dirty="0"/>
+              <a:t>Efficient handling of large projects</a:t>
             </a:r>
             <a:endParaRPr lang="tr-TR" sz="4000" dirty="0"/>
           </a:p>

</xml_diff>